<commit_message>
push all thing, not refactored yet
</commit_message>
<xml_diff>
--- a/Presentation1.pptx
+++ b/Presentation1.pptx
@@ -6,6 +6,9 @@
   </p:sldMasterIdLst>
   <p:sldIdLst>
     <p:sldId id="256" r:id="rId2"/>
+    <p:sldId id="257" r:id="rId3"/>
+    <p:sldId id="258" r:id="rId4"/>
+    <p:sldId id="259" r:id="rId5"/>
   </p:sldIdLst>
   <p:sldSz cx="12192000" cy="6858000"/>
   <p:notesSz cx="6858000" cy="9144000"/>
@@ -104,6 +107,11 @@
       </a:defRPr>
     </a:lvl9pPr>
   </p:defaultTextStyle>
+  <p:extLst>
+    <p:ext uri="{EFAFB233-063F-42B5-8137-9DF3F51BA10A}">
+      <p15:sldGuideLst xmlns:p15="http://schemas.microsoft.com/office/powerpoint/2012/main"/>
+    </p:ext>
+  </p:extLst>
 </p:presentation>
 </file>
 
@@ -254,7 +262,7 @@
           <a:p>
             <a:fld id="{FFF1DA85-F2A7-4CA3-8EE9-4F94A16A5400}" type="datetimeFigureOut">
               <a:rPr lang="en-US" smtClean="0"/>
-              <a:t>12/26/2023</a:t>
+              <a:t>1/15/2024</a:t>
             </a:fld>
             <a:endParaRPr lang="en-US"/>
           </a:p>
@@ -452,7 +460,7 @@
           <a:p>
             <a:fld id="{FFF1DA85-F2A7-4CA3-8EE9-4F94A16A5400}" type="datetimeFigureOut">
               <a:rPr lang="en-US" smtClean="0"/>
-              <a:t>12/26/2023</a:t>
+              <a:t>1/15/2024</a:t>
             </a:fld>
             <a:endParaRPr lang="en-US"/>
           </a:p>
@@ -660,7 +668,7 @@
           <a:p>
             <a:fld id="{FFF1DA85-F2A7-4CA3-8EE9-4F94A16A5400}" type="datetimeFigureOut">
               <a:rPr lang="en-US" smtClean="0"/>
-              <a:t>12/26/2023</a:t>
+              <a:t>1/15/2024</a:t>
             </a:fld>
             <a:endParaRPr lang="en-US"/>
           </a:p>
@@ -858,7 +866,7 @@
           <a:p>
             <a:fld id="{FFF1DA85-F2A7-4CA3-8EE9-4F94A16A5400}" type="datetimeFigureOut">
               <a:rPr lang="en-US" smtClean="0"/>
-              <a:t>12/26/2023</a:t>
+              <a:t>1/15/2024</a:t>
             </a:fld>
             <a:endParaRPr lang="en-US"/>
           </a:p>
@@ -1133,7 +1141,7 @@
           <a:p>
             <a:fld id="{FFF1DA85-F2A7-4CA3-8EE9-4F94A16A5400}" type="datetimeFigureOut">
               <a:rPr lang="en-US" smtClean="0"/>
-              <a:t>12/26/2023</a:t>
+              <a:t>1/15/2024</a:t>
             </a:fld>
             <a:endParaRPr lang="en-US"/>
           </a:p>
@@ -1398,7 +1406,7 @@
           <a:p>
             <a:fld id="{FFF1DA85-F2A7-4CA3-8EE9-4F94A16A5400}" type="datetimeFigureOut">
               <a:rPr lang="en-US" smtClean="0"/>
-              <a:t>12/26/2023</a:t>
+              <a:t>1/15/2024</a:t>
             </a:fld>
             <a:endParaRPr lang="en-US"/>
           </a:p>
@@ -1810,7 +1818,7 @@
           <a:p>
             <a:fld id="{FFF1DA85-F2A7-4CA3-8EE9-4F94A16A5400}" type="datetimeFigureOut">
               <a:rPr lang="en-US" smtClean="0"/>
-              <a:t>12/26/2023</a:t>
+              <a:t>1/15/2024</a:t>
             </a:fld>
             <a:endParaRPr lang="en-US"/>
           </a:p>
@@ -1951,7 +1959,7 @@
           <a:p>
             <a:fld id="{FFF1DA85-F2A7-4CA3-8EE9-4F94A16A5400}" type="datetimeFigureOut">
               <a:rPr lang="en-US" smtClean="0"/>
-              <a:t>12/26/2023</a:t>
+              <a:t>1/15/2024</a:t>
             </a:fld>
             <a:endParaRPr lang="en-US"/>
           </a:p>
@@ -2064,7 +2072,7 @@
           <a:p>
             <a:fld id="{FFF1DA85-F2A7-4CA3-8EE9-4F94A16A5400}" type="datetimeFigureOut">
               <a:rPr lang="en-US" smtClean="0"/>
-              <a:t>12/26/2023</a:t>
+              <a:t>1/15/2024</a:t>
             </a:fld>
             <a:endParaRPr lang="en-US"/>
           </a:p>
@@ -2375,7 +2383,7 @@
           <a:p>
             <a:fld id="{FFF1DA85-F2A7-4CA3-8EE9-4F94A16A5400}" type="datetimeFigureOut">
               <a:rPr lang="en-US" smtClean="0"/>
-              <a:t>12/26/2023</a:t>
+              <a:t>1/15/2024</a:t>
             </a:fld>
             <a:endParaRPr lang="en-US"/>
           </a:p>
@@ -2663,7 +2671,7 @@
           <a:p>
             <a:fld id="{FFF1DA85-F2A7-4CA3-8EE9-4F94A16A5400}" type="datetimeFigureOut">
               <a:rPr lang="en-US" smtClean="0"/>
-              <a:t>12/26/2023</a:t>
+              <a:t>1/15/2024</a:t>
             </a:fld>
             <a:endParaRPr lang="en-US"/>
           </a:p>
@@ -2904,7 +2912,7 @@
           <a:p>
             <a:fld id="{FFF1DA85-F2A7-4CA3-8EE9-4F94A16A5400}" type="datetimeFigureOut">
               <a:rPr lang="en-US" smtClean="0"/>
-              <a:t>12/26/2023</a:t>
+              <a:t>1/15/2024</a:t>
             </a:fld>
             <a:endParaRPr lang="en-US"/>
           </a:p>
@@ -4166,8 +4174,8 @@
         </p:nvSpPr>
         <p:spPr>
           <a:xfrm>
-            <a:off x="8978184" y="1199071"/>
-            <a:ext cx="1808665" cy="802256"/>
+            <a:off x="8978185" y="1199071"/>
+            <a:ext cx="1283410" cy="802256"/>
           </a:xfrm>
           <a:prstGeom prst="roundRect">
             <a:avLst/>
@@ -4193,20 +4201,21 @@
           <a:p>
             <a:pPr algn="ctr"/>
             <a:r>
-              <a:rPr lang="en-US" dirty="0"/>
-              <a:t>Not fall</a:t>
+              <a:rPr lang="en-US"/>
+              <a:t>Not fall or</a:t>
             </a:r>
             <a:br>
               <a:rPr lang="en-US" dirty="0"/>
             </a:br>
             <a:r>
-              <a:rPr lang="en-US" dirty="0" err="1"/>
+              <a:rPr lang="en-US" err="1"/>
               <a:t>Fall</a:t>
             </a:r>
             <a:r>
-              <a:rPr lang="en-US" dirty="0"/>
-              <a:t> or Lie down</a:t>
-            </a:r>
+              <a:rPr lang="en-US"/>
+              <a:t> or Lie</a:t>
+            </a:r>
+            <a:endParaRPr lang="en-US" dirty="0"/>
           </a:p>
         </p:txBody>
       </p:sp>
@@ -4225,7 +4234,7 @@
         <p:spPr>
           <a:xfrm>
             <a:off x="8978185" y="2398143"/>
-            <a:ext cx="1808664" cy="802256"/>
+            <a:ext cx="1283409" cy="802256"/>
           </a:xfrm>
           <a:prstGeom prst="roundRect">
             <a:avLst/>
@@ -4251,20 +4260,17 @@
           <a:p>
             <a:pPr algn="ctr"/>
             <a:r>
-              <a:rPr lang="en-US" dirty="0"/>
-              <a:t>Not fall</a:t>
+              <a:rPr lang="en-US"/>
+              <a:t>Not fall or</a:t>
             </a:r>
             <a:br>
-              <a:rPr lang="en-US" dirty="0"/>
+              <a:rPr lang="en-US"/>
             </a:br>
             <a:r>
-              <a:rPr lang="en-US" dirty="0" err="1"/>
-              <a:t>Fall</a:t>
-            </a:r>
-            <a:r>
-              <a:rPr lang="en-US" dirty="0"/>
-              <a:t> or Lie down</a:t>
-            </a:r>
+              <a:rPr lang="en-US"/>
+              <a:t>Fall or Lie</a:t>
+            </a:r>
+            <a:endParaRPr lang="en-US" dirty="0"/>
           </a:p>
         </p:txBody>
       </p:sp>
@@ -4282,7 +4288,7 @@
         </p:nvSpPr>
         <p:spPr>
           <a:xfrm>
-            <a:off x="9737303" y="3597215"/>
+            <a:off x="9438765" y="3597214"/>
             <a:ext cx="524290" cy="802256"/>
           </a:xfrm>
           <a:prstGeom prst="roundRect">
@@ -4368,7 +4374,7 @@
         <p:spPr>
           <a:xfrm>
             <a:off x="8978184" y="4796287"/>
-            <a:ext cx="1808664" cy="802256"/>
+            <a:ext cx="1283409" cy="802256"/>
           </a:xfrm>
           <a:prstGeom prst="roundRect">
             <a:avLst/>
@@ -4394,8 +4400,8 @@
           <a:p>
             <a:pPr algn="ctr"/>
             <a:r>
-              <a:rPr lang="en-US" dirty="0"/>
-              <a:t>Not fall</a:t>
+              <a:rPr lang="en-US"/>
+              <a:t>Not fall or </a:t>
             </a:r>
             <a:br>
               <a:rPr lang="en-US" dirty="0"/>
@@ -4406,8 +4412,13 @@
             </a:r>
             <a:r>
               <a:rPr lang="en-US" dirty="0"/>
-              <a:t> or Lie down</a:t>
-            </a:r>
+              <a:t> </a:t>
+            </a:r>
+            <a:r>
+              <a:rPr lang="en-US"/>
+              <a:t>or Lie</a:t>
+            </a:r>
+            <a:endParaRPr lang="en-US" dirty="0"/>
           </a:p>
         </p:txBody>
       </p:sp>
@@ -4473,7 +4484,7 @@
         <p:spPr>
           <a:xfrm>
             <a:off x="8548777" y="1600199"/>
-            <a:ext cx="429407" cy="0"/>
+            <a:ext cx="429408" cy="0"/>
           </a:xfrm>
           <a:prstGeom prst="straightConnector1">
             <a:avLst/>
@@ -4673,6 +4684,916 @@
     <p:extLst>
       <p:ext uri="{BB962C8B-B14F-4D97-AF65-F5344CB8AC3E}">
         <p14:creationId xmlns:p14="http://schemas.microsoft.com/office/powerpoint/2010/main" val="705212855"/>
+      </p:ext>
+    </p:extLst>
+  </p:cSld>
+  <p:clrMapOvr>
+    <a:masterClrMapping/>
+  </p:clrMapOvr>
+</p:sld>
+</file>
+
+<file path=ppt/slides/slide2.xml><?xml version="1.0" encoding="utf-8"?>
+<p:sld xmlns:a="http://schemas.openxmlformats.org/drawingml/2006/main" xmlns:r="http://schemas.openxmlformats.org/officeDocument/2006/relationships" xmlns:p="http://schemas.openxmlformats.org/presentationml/2006/main">
+  <p:cSld>
+    <p:spTree>
+      <p:nvGrpSpPr>
+        <p:cNvPr id="1" name=""/>
+        <p:cNvGrpSpPr/>
+        <p:nvPr/>
+      </p:nvGrpSpPr>
+      <p:grpSpPr>
+        <a:xfrm>
+          <a:off x="0" y="0"/>
+          <a:ext cx="0" cy="0"/>
+          <a:chOff x="0" y="0"/>
+          <a:chExt cx="0" cy="0"/>
+        </a:xfrm>
+      </p:grpSpPr>
+      <p:pic>
+        <p:nvPicPr>
+          <p:cNvPr id="4" name="Picture 3">
+            <a:extLst>
+              <a:ext uri="{FF2B5EF4-FFF2-40B4-BE49-F238E27FC236}">
+                <a16:creationId xmlns:a16="http://schemas.microsoft.com/office/drawing/2014/main" id="{F39BAFE9-FACE-3990-8B3D-345354461A09}"/>
+              </a:ext>
+            </a:extLst>
+          </p:cNvPr>
+          <p:cNvPicPr>
+            <a:picLocks noChangeAspect="1"/>
+          </p:cNvPicPr>
+          <p:nvPr/>
+        </p:nvPicPr>
+        <p:blipFill>
+          <a:blip r:embed="rId2" cstate="print">
+            <a:extLst>
+              <a:ext uri="{28A0092B-C50C-407E-A947-70E740481C1C}">
+                <a14:useLocalDpi xmlns:a14="http://schemas.microsoft.com/office/drawing/2010/main" val="0"/>
+              </a:ext>
+            </a:extLst>
+          </a:blip>
+          <a:srcRect/>
+          <a:stretch>
+            <a:fillRect/>
+          </a:stretch>
+        </p:blipFill>
+        <p:spPr bwMode="auto">
+          <a:xfrm>
+            <a:off x="575988" y="673738"/>
+            <a:ext cx="11040023" cy="5510524"/>
+          </a:xfrm>
+          <a:prstGeom prst="rect">
+            <a:avLst/>
+          </a:prstGeom>
+          <a:noFill/>
+          <a:ln>
+            <a:noFill/>
+          </a:ln>
+        </p:spPr>
+      </p:pic>
+      <p:sp>
+        <p:nvSpPr>
+          <p:cNvPr id="5" name="Rectangle: Rounded Corners 4">
+            <a:extLst>
+              <a:ext uri="{FF2B5EF4-FFF2-40B4-BE49-F238E27FC236}">
+                <a16:creationId xmlns:a16="http://schemas.microsoft.com/office/drawing/2014/main" id="{CDB759CF-1600-0556-1DCB-E9AF7B3CAEF7}"/>
+              </a:ext>
+            </a:extLst>
+          </p:cNvPr>
+          <p:cNvSpPr/>
+          <p:nvPr/>
+        </p:nvSpPr>
+        <p:spPr>
+          <a:xfrm>
+            <a:off x="2708695" y="1915065"/>
+            <a:ext cx="1121434" cy="629728"/>
+          </a:xfrm>
+          <a:prstGeom prst="roundRect">
+            <a:avLst/>
+          </a:prstGeom>
+          <a:solidFill>
+            <a:srgbClr val="EDABFF"/>
+          </a:solidFill>
+        </p:spPr>
+        <p:style>
+          <a:lnRef idx="2">
+            <a:schemeClr val="accent1">
+              <a:shade val="15000"/>
+            </a:schemeClr>
+          </a:lnRef>
+          <a:fillRef idx="1">
+            <a:schemeClr val="accent1"/>
+          </a:fillRef>
+          <a:effectRef idx="0">
+            <a:schemeClr val="accent1"/>
+          </a:effectRef>
+          <a:fontRef idx="minor">
+            <a:schemeClr val="lt1"/>
+          </a:fontRef>
+        </p:style>
+        <p:txBody>
+          <a:bodyPr rtlCol="0" anchor="ctr"/>
+          <a:lstStyle/>
+          <a:p>
+            <a:pPr algn="ctr"/>
+            <a:r>
+              <a:rPr lang="en-US" sz="1600" b="1" dirty="0">
+                <a:solidFill>
+                  <a:schemeClr val="tx1"/>
+                </a:solidFill>
+              </a:rPr>
+              <a:t>MOVENET</a:t>
+            </a:r>
+          </a:p>
+        </p:txBody>
+      </p:sp>
+      <p:sp>
+        <p:nvSpPr>
+          <p:cNvPr id="7" name="Rectangle: Rounded Corners 6">
+            <a:extLst>
+              <a:ext uri="{FF2B5EF4-FFF2-40B4-BE49-F238E27FC236}">
+                <a16:creationId xmlns:a16="http://schemas.microsoft.com/office/drawing/2014/main" id="{B9355364-C157-74C6-6C53-9C2E7B02D6EF}"/>
+              </a:ext>
+            </a:extLst>
+          </p:cNvPr>
+          <p:cNvSpPr/>
+          <p:nvPr/>
+        </p:nvSpPr>
+        <p:spPr>
+          <a:xfrm>
+            <a:off x="3352800" y="5241985"/>
+            <a:ext cx="1121434" cy="629728"/>
+          </a:xfrm>
+          <a:prstGeom prst="roundRect">
+            <a:avLst/>
+          </a:prstGeom>
+          <a:solidFill>
+            <a:srgbClr val="EDABFF"/>
+          </a:solidFill>
+        </p:spPr>
+        <p:style>
+          <a:lnRef idx="2">
+            <a:schemeClr val="accent1">
+              <a:shade val="15000"/>
+            </a:schemeClr>
+          </a:lnRef>
+          <a:fillRef idx="1">
+            <a:schemeClr val="accent1"/>
+          </a:fillRef>
+          <a:effectRef idx="0">
+            <a:schemeClr val="accent1"/>
+          </a:effectRef>
+          <a:fontRef idx="minor">
+            <a:schemeClr val="lt1"/>
+          </a:fontRef>
+        </p:style>
+        <p:txBody>
+          <a:bodyPr rtlCol="0" anchor="ctr"/>
+          <a:lstStyle/>
+          <a:p>
+            <a:pPr algn="ctr"/>
+            <a:r>
+              <a:rPr lang="en-US" sz="1600" b="1" dirty="0">
+                <a:solidFill>
+                  <a:schemeClr val="tx1"/>
+                </a:solidFill>
+              </a:rPr>
+              <a:t>MOVENET</a:t>
+            </a:r>
+          </a:p>
+        </p:txBody>
+      </p:sp>
+      <p:sp>
+        <p:nvSpPr>
+          <p:cNvPr id="8" name="Rectangle: Rounded Corners 7">
+            <a:extLst>
+              <a:ext uri="{FF2B5EF4-FFF2-40B4-BE49-F238E27FC236}">
+                <a16:creationId xmlns:a16="http://schemas.microsoft.com/office/drawing/2014/main" id="{4DEC896C-7C29-D53E-77BD-3EB73CA9B91D}"/>
+              </a:ext>
+            </a:extLst>
+          </p:cNvPr>
+          <p:cNvSpPr/>
+          <p:nvPr/>
+        </p:nvSpPr>
+        <p:spPr>
+          <a:xfrm>
+            <a:off x="9374038" y="1935633"/>
+            <a:ext cx="1227826" cy="609160"/>
+          </a:xfrm>
+          <a:prstGeom prst="roundRect">
+            <a:avLst/>
+          </a:prstGeom>
+          <a:solidFill>
+            <a:schemeClr val="accent6">
+              <a:lumMod val="60000"/>
+              <a:lumOff val="40000"/>
+            </a:schemeClr>
+          </a:solidFill>
+        </p:spPr>
+        <p:style>
+          <a:lnRef idx="2">
+            <a:schemeClr val="accent1">
+              <a:shade val="15000"/>
+            </a:schemeClr>
+          </a:lnRef>
+          <a:fillRef idx="1">
+            <a:schemeClr val="accent1"/>
+          </a:fillRef>
+          <a:effectRef idx="0">
+            <a:schemeClr val="accent1"/>
+          </a:effectRef>
+          <a:fontRef idx="minor">
+            <a:schemeClr val="lt1"/>
+          </a:fontRef>
+        </p:style>
+        <p:txBody>
+          <a:bodyPr rtlCol="0" anchor="ctr"/>
+          <a:lstStyle/>
+          <a:p>
+            <a:pPr algn="ctr"/>
+            <a:r>
+              <a:rPr lang="en-US" sz="1600" b="1" dirty="0">
+                <a:solidFill>
+                  <a:schemeClr val="tx1"/>
+                </a:solidFill>
+              </a:rPr>
+              <a:t>LSTM</a:t>
+            </a:r>
+          </a:p>
+        </p:txBody>
+      </p:sp>
+    </p:spTree>
+    <p:extLst>
+      <p:ext uri="{BB962C8B-B14F-4D97-AF65-F5344CB8AC3E}">
+        <p14:creationId xmlns:p14="http://schemas.microsoft.com/office/powerpoint/2010/main" val="2579894344"/>
+      </p:ext>
+    </p:extLst>
+  </p:cSld>
+  <p:clrMapOvr>
+    <a:masterClrMapping/>
+  </p:clrMapOvr>
+</p:sld>
+</file>
+
+<file path=ppt/slides/slide3.xml><?xml version="1.0" encoding="utf-8"?>
+<p:sld xmlns:a="http://schemas.openxmlformats.org/drawingml/2006/main" xmlns:r="http://schemas.openxmlformats.org/officeDocument/2006/relationships" xmlns:p="http://schemas.openxmlformats.org/presentationml/2006/main">
+  <p:cSld>
+    <p:spTree>
+      <p:nvGrpSpPr>
+        <p:cNvPr id="1" name=""/>
+        <p:cNvGrpSpPr/>
+        <p:nvPr/>
+      </p:nvGrpSpPr>
+      <p:grpSpPr>
+        <a:xfrm>
+          <a:off x="0" y="0"/>
+          <a:ext cx="0" cy="0"/>
+          <a:chOff x="0" y="0"/>
+          <a:chExt cx="0" cy="0"/>
+        </a:xfrm>
+      </p:grpSpPr>
+      <p:pic>
+        <p:nvPicPr>
+          <p:cNvPr id="7" name="Picture 6">
+            <a:extLst>
+              <a:ext uri="{FF2B5EF4-FFF2-40B4-BE49-F238E27FC236}">
+                <a16:creationId xmlns:a16="http://schemas.microsoft.com/office/drawing/2014/main" id="{2DB1E115-2C93-0C03-322B-9D4474FD0F22}"/>
+              </a:ext>
+            </a:extLst>
+          </p:cNvPr>
+          <p:cNvPicPr>
+            <a:picLocks noChangeAspect="1"/>
+          </p:cNvPicPr>
+          <p:nvPr/>
+        </p:nvPicPr>
+        <p:blipFill>
+          <a:blip r:embed="rId2"/>
+          <a:stretch>
+            <a:fillRect/>
+          </a:stretch>
+        </p:blipFill>
+        <p:spPr>
+          <a:xfrm>
+            <a:off x="1302853" y="919684"/>
+            <a:ext cx="9586293" cy="5018632"/>
+          </a:xfrm>
+          <a:prstGeom prst="rect">
+            <a:avLst/>
+          </a:prstGeom>
+        </p:spPr>
+      </p:pic>
+      <p:sp>
+        <p:nvSpPr>
+          <p:cNvPr id="5" name="Rectangle: Rounded Corners 4">
+            <a:extLst>
+              <a:ext uri="{FF2B5EF4-FFF2-40B4-BE49-F238E27FC236}">
+                <a16:creationId xmlns:a16="http://schemas.microsoft.com/office/drawing/2014/main" id="{CDB759CF-1600-0556-1DCB-E9AF7B3CAEF7}"/>
+              </a:ext>
+            </a:extLst>
+          </p:cNvPr>
+          <p:cNvSpPr/>
+          <p:nvPr/>
+        </p:nvSpPr>
+        <p:spPr>
+          <a:xfrm>
+            <a:off x="2771956" y="2156603"/>
+            <a:ext cx="963282" cy="621103"/>
+          </a:xfrm>
+          <a:prstGeom prst="roundRect">
+            <a:avLst/>
+          </a:prstGeom>
+          <a:solidFill>
+            <a:srgbClr val="EDABFF"/>
+          </a:solidFill>
+        </p:spPr>
+        <p:style>
+          <a:lnRef idx="2">
+            <a:schemeClr val="accent1">
+              <a:shade val="15000"/>
+            </a:schemeClr>
+          </a:lnRef>
+          <a:fillRef idx="1">
+            <a:schemeClr val="accent1"/>
+          </a:fillRef>
+          <a:effectRef idx="0">
+            <a:schemeClr val="accent1"/>
+          </a:effectRef>
+          <a:fontRef idx="minor">
+            <a:schemeClr val="lt1"/>
+          </a:fontRef>
+        </p:style>
+        <p:txBody>
+          <a:bodyPr rtlCol="0" anchor="ctr"/>
+          <a:lstStyle/>
+          <a:p>
+            <a:pPr algn="ctr"/>
+            <a:r>
+              <a:rPr lang="en-US" sz="1600" b="1" dirty="0">
+                <a:solidFill>
+                  <a:schemeClr val="tx1"/>
+                </a:solidFill>
+              </a:rPr>
+              <a:t>MOVENET</a:t>
+            </a:r>
+          </a:p>
+        </p:txBody>
+      </p:sp>
+      <p:sp>
+        <p:nvSpPr>
+          <p:cNvPr id="6" name="Rectangle: Rounded Corners 5">
+            <a:extLst>
+              <a:ext uri="{FF2B5EF4-FFF2-40B4-BE49-F238E27FC236}">
+                <a16:creationId xmlns:a16="http://schemas.microsoft.com/office/drawing/2014/main" id="{6FDD7462-A332-7879-AC6C-61920B922D01}"/>
+              </a:ext>
+            </a:extLst>
+          </p:cNvPr>
+          <p:cNvSpPr/>
+          <p:nvPr/>
+        </p:nvSpPr>
+        <p:spPr>
+          <a:xfrm>
+            <a:off x="3344174" y="5216105"/>
+            <a:ext cx="1121434" cy="690113"/>
+          </a:xfrm>
+          <a:prstGeom prst="roundRect">
+            <a:avLst/>
+          </a:prstGeom>
+          <a:solidFill>
+            <a:srgbClr val="EDABFF"/>
+          </a:solidFill>
+        </p:spPr>
+        <p:style>
+          <a:lnRef idx="2">
+            <a:schemeClr val="accent1">
+              <a:shade val="15000"/>
+            </a:schemeClr>
+          </a:lnRef>
+          <a:fillRef idx="1">
+            <a:schemeClr val="accent1"/>
+          </a:fillRef>
+          <a:effectRef idx="0">
+            <a:schemeClr val="accent1"/>
+          </a:effectRef>
+          <a:fontRef idx="minor">
+            <a:schemeClr val="lt1"/>
+          </a:fontRef>
+        </p:style>
+        <p:txBody>
+          <a:bodyPr rtlCol="0" anchor="ctr"/>
+          <a:lstStyle/>
+          <a:p>
+            <a:pPr algn="ctr"/>
+            <a:r>
+              <a:rPr lang="en-US" sz="1600" b="1" dirty="0">
+                <a:solidFill>
+                  <a:schemeClr val="tx1"/>
+                </a:solidFill>
+              </a:rPr>
+              <a:t>MOVENET</a:t>
+            </a:r>
+          </a:p>
+        </p:txBody>
+      </p:sp>
+    </p:spTree>
+    <p:extLst>
+      <p:ext uri="{BB962C8B-B14F-4D97-AF65-F5344CB8AC3E}">
+        <p14:creationId xmlns:p14="http://schemas.microsoft.com/office/powerpoint/2010/main" val="4004651429"/>
+      </p:ext>
+    </p:extLst>
+  </p:cSld>
+  <p:clrMapOvr>
+    <a:masterClrMapping/>
+  </p:clrMapOvr>
+</p:sld>
+</file>
+
+<file path=ppt/slides/slide4.xml><?xml version="1.0" encoding="utf-8"?>
+<p:sld xmlns:a="http://schemas.openxmlformats.org/drawingml/2006/main" xmlns:r="http://schemas.openxmlformats.org/officeDocument/2006/relationships" xmlns:p="http://schemas.openxmlformats.org/presentationml/2006/main">
+  <p:cSld>
+    <p:spTree>
+      <p:nvGrpSpPr>
+        <p:cNvPr id="1" name=""/>
+        <p:cNvGrpSpPr/>
+        <p:nvPr/>
+      </p:nvGrpSpPr>
+      <p:grpSpPr>
+        <a:xfrm>
+          <a:off x="0" y="0"/>
+          <a:ext cx="0" cy="0"/>
+          <a:chOff x="0" y="0"/>
+          <a:chExt cx="0" cy="0"/>
+        </a:xfrm>
+      </p:grpSpPr>
+      <p:cxnSp>
+        <p:nvCxnSpPr>
+          <p:cNvPr id="5" name="Straight Arrow Connector 4">
+            <a:extLst>
+              <a:ext uri="{FF2B5EF4-FFF2-40B4-BE49-F238E27FC236}">
+                <a16:creationId xmlns:a16="http://schemas.microsoft.com/office/drawing/2014/main" id="{FC4ADA33-E7C8-AA45-E9F3-FD7C7977E4A4}"/>
+              </a:ext>
+            </a:extLst>
+          </p:cNvPr>
+          <p:cNvCxnSpPr/>
+          <p:nvPr/>
+        </p:nvCxnSpPr>
+        <p:spPr>
+          <a:xfrm>
+            <a:off x="4936603" y="1157468"/>
+            <a:ext cx="0" cy="3958542"/>
+          </a:xfrm>
+          <a:prstGeom prst="straightConnector1">
+            <a:avLst/>
+          </a:prstGeom>
+          <a:ln w="9525" cap="flat" cmpd="sng" algn="ctr">
+            <a:solidFill>
+              <a:schemeClr val="dk1"/>
+            </a:solidFill>
+            <a:prstDash val="solid"/>
+            <a:round/>
+            <a:headEnd type="arrow" w="med" len="med"/>
+            <a:tailEnd type="arrow" w="med" len="med"/>
+          </a:ln>
+        </p:spPr>
+        <p:style>
+          <a:lnRef idx="0">
+            <a:scrgbClr r="0" g="0" b="0"/>
+          </a:lnRef>
+          <a:fillRef idx="0">
+            <a:scrgbClr r="0" g="0" b="0"/>
+          </a:fillRef>
+          <a:effectRef idx="0">
+            <a:scrgbClr r="0" g="0" b="0"/>
+          </a:effectRef>
+          <a:fontRef idx="minor">
+            <a:schemeClr val="tx1"/>
+          </a:fontRef>
+        </p:style>
+      </p:cxnSp>
+      <p:cxnSp>
+        <p:nvCxnSpPr>
+          <p:cNvPr id="6" name="Straight Arrow Connector 5">
+            <a:extLst>
+              <a:ext uri="{FF2B5EF4-FFF2-40B4-BE49-F238E27FC236}">
+                <a16:creationId xmlns:a16="http://schemas.microsoft.com/office/drawing/2014/main" id="{6F9B67C6-18A1-1882-9759-369894063EFC}"/>
+              </a:ext>
+            </a:extLst>
+          </p:cNvPr>
+          <p:cNvCxnSpPr>
+            <a:cxnSpLocks/>
+          </p:cNvCxnSpPr>
+          <p:nvPr/>
+        </p:nvCxnSpPr>
+        <p:spPr>
+          <a:xfrm>
+            <a:off x="2963119" y="3022921"/>
+            <a:ext cx="4053069" cy="0"/>
+          </a:xfrm>
+          <a:prstGeom prst="straightConnector1">
+            <a:avLst/>
+          </a:prstGeom>
+          <a:ln w="9525" cap="flat" cmpd="sng" algn="ctr">
+            <a:solidFill>
+              <a:schemeClr val="dk1"/>
+            </a:solidFill>
+            <a:prstDash val="solid"/>
+            <a:round/>
+            <a:headEnd type="arrow" w="med" len="med"/>
+            <a:tailEnd type="arrow" w="med" len="med"/>
+          </a:ln>
+        </p:spPr>
+        <p:style>
+          <a:lnRef idx="0">
+            <a:scrgbClr r="0" g="0" b="0"/>
+          </a:lnRef>
+          <a:fillRef idx="0">
+            <a:scrgbClr r="0" g="0" b="0"/>
+          </a:fillRef>
+          <a:effectRef idx="0">
+            <a:scrgbClr r="0" g="0" b="0"/>
+          </a:effectRef>
+          <a:fontRef idx="minor">
+            <a:schemeClr val="tx1"/>
+          </a:fontRef>
+        </p:style>
+      </p:cxnSp>
+      <p:cxnSp>
+        <p:nvCxnSpPr>
+          <p:cNvPr id="10" name="Straight Arrow Connector 9">
+            <a:extLst>
+              <a:ext uri="{FF2B5EF4-FFF2-40B4-BE49-F238E27FC236}">
+                <a16:creationId xmlns:a16="http://schemas.microsoft.com/office/drawing/2014/main" id="{E29D9D3A-52DF-5D06-81F5-CE29E1A22970}"/>
+              </a:ext>
+            </a:extLst>
+          </p:cNvPr>
+          <p:cNvCxnSpPr>
+            <a:cxnSpLocks/>
+          </p:cNvCxnSpPr>
+          <p:nvPr/>
+        </p:nvCxnSpPr>
+        <p:spPr>
+          <a:xfrm flipV="1">
+            <a:off x="2870522" y="1157468"/>
+            <a:ext cx="4145666" cy="3727048"/>
+          </a:xfrm>
+          <a:prstGeom prst="straightConnector1">
+            <a:avLst/>
+          </a:prstGeom>
+          <a:ln w="9525" cap="flat" cmpd="sng" algn="ctr">
+            <a:solidFill>
+              <a:schemeClr val="accent1"/>
+            </a:solidFill>
+            <a:prstDash val="solid"/>
+            <a:round/>
+            <a:headEnd type="arrow" w="med" len="med"/>
+            <a:tailEnd type="arrow" w="med" len="med"/>
+          </a:ln>
+        </p:spPr>
+        <p:style>
+          <a:lnRef idx="0">
+            <a:scrgbClr r="0" g="0" b="0"/>
+          </a:lnRef>
+          <a:fillRef idx="0">
+            <a:scrgbClr r="0" g="0" b="0"/>
+          </a:fillRef>
+          <a:effectRef idx="0">
+            <a:scrgbClr r="0" g="0" b="0"/>
+          </a:effectRef>
+          <a:fontRef idx="minor">
+            <a:schemeClr val="tx1"/>
+          </a:fontRef>
+        </p:style>
+      </p:cxnSp>
+      <p:cxnSp>
+        <p:nvCxnSpPr>
+          <p:cNvPr id="15" name="Straight Arrow Connector 14">
+            <a:extLst>
+              <a:ext uri="{FF2B5EF4-FFF2-40B4-BE49-F238E27FC236}">
+                <a16:creationId xmlns:a16="http://schemas.microsoft.com/office/drawing/2014/main" id="{A72E0E22-7207-CE20-6B79-3325C14AFA1C}"/>
+              </a:ext>
+            </a:extLst>
+          </p:cNvPr>
+          <p:cNvCxnSpPr>
+            <a:cxnSpLocks/>
+          </p:cNvCxnSpPr>
+          <p:nvPr/>
+        </p:nvCxnSpPr>
+        <p:spPr>
+          <a:xfrm>
+            <a:off x="2963119" y="1157468"/>
+            <a:ext cx="4053069" cy="3813859"/>
+          </a:xfrm>
+          <a:prstGeom prst="straightConnector1">
+            <a:avLst/>
+          </a:prstGeom>
+          <a:ln w="9525" cap="flat" cmpd="sng" algn="ctr">
+            <a:solidFill>
+              <a:schemeClr val="accent1"/>
+            </a:solidFill>
+            <a:prstDash val="solid"/>
+            <a:round/>
+            <a:headEnd type="arrow" w="med" len="med"/>
+            <a:tailEnd type="arrow" w="med" len="med"/>
+          </a:ln>
+        </p:spPr>
+        <p:style>
+          <a:lnRef idx="0">
+            <a:scrgbClr r="0" g="0" b="0"/>
+          </a:lnRef>
+          <a:fillRef idx="0">
+            <a:scrgbClr r="0" g="0" b="0"/>
+          </a:fillRef>
+          <a:effectRef idx="0">
+            <a:scrgbClr r="0" g="0" b="0"/>
+          </a:effectRef>
+          <a:fontRef idx="minor">
+            <a:schemeClr val="tx1"/>
+          </a:fontRef>
+        </p:style>
+      </p:cxnSp>
+      <p:sp>
+        <p:nvSpPr>
+          <p:cNvPr id="21" name="TextBox 20">
+            <a:extLst>
+              <a:ext uri="{FF2B5EF4-FFF2-40B4-BE49-F238E27FC236}">
+                <a16:creationId xmlns:a16="http://schemas.microsoft.com/office/drawing/2014/main" id="{F5C778D4-2A47-C24C-46D1-08F8E5C47281}"/>
+              </a:ext>
+            </a:extLst>
+          </p:cNvPr>
+          <p:cNvSpPr txBox="1"/>
+          <p:nvPr/>
+        </p:nvSpPr>
+        <p:spPr>
+          <a:xfrm>
+            <a:off x="4517986" y="788136"/>
+            <a:ext cx="850738" cy="369332"/>
+          </a:xfrm>
+          <a:prstGeom prst="rect">
+            <a:avLst/>
+          </a:prstGeom>
+          <a:noFill/>
+        </p:spPr>
+        <p:txBody>
+          <a:bodyPr wrap="square" rtlCol="0">
+            <a:spAutoFit/>
+          </a:bodyPr>
+          <a:lstStyle/>
+          <a:p>
+            <a:r>
+              <a:rPr lang="en-US" dirty="0"/>
+              <a:t>North</a:t>
+            </a:r>
+          </a:p>
+        </p:txBody>
+      </p:sp>
+      <p:sp>
+        <p:nvSpPr>
+          <p:cNvPr id="23" name="TextBox 22">
+            <a:extLst>
+              <a:ext uri="{FF2B5EF4-FFF2-40B4-BE49-F238E27FC236}">
+                <a16:creationId xmlns:a16="http://schemas.microsoft.com/office/drawing/2014/main" id="{42851FA6-7C03-BAC3-C453-569BDECCCBCC}"/>
+              </a:ext>
+            </a:extLst>
+          </p:cNvPr>
+          <p:cNvSpPr txBox="1"/>
+          <p:nvPr/>
+        </p:nvSpPr>
+        <p:spPr>
+          <a:xfrm>
+            <a:off x="7108785" y="2834055"/>
+            <a:ext cx="850738" cy="369332"/>
+          </a:xfrm>
+          <a:prstGeom prst="rect">
+            <a:avLst/>
+          </a:prstGeom>
+          <a:noFill/>
+        </p:spPr>
+        <p:txBody>
+          <a:bodyPr wrap="square" rtlCol="0">
+            <a:spAutoFit/>
+          </a:bodyPr>
+          <a:lstStyle/>
+          <a:p>
+            <a:r>
+              <a:rPr lang="en-US" dirty="0"/>
+              <a:t>East</a:t>
+            </a:r>
+          </a:p>
+        </p:txBody>
+      </p:sp>
+      <p:sp>
+        <p:nvSpPr>
+          <p:cNvPr id="24" name="TextBox 23">
+            <a:extLst>
+              <a:ext uri="{FF2B5EF4-FFF2-40B4-BE49-F238E27FC236}">
+                <a16:creationId xmlns:a16="http://schemas.microsoft.com/office/drawing/2014/main" id="{2A39B9AF-EBB6-DB1F-8495-0C5B514C4850}"/>
+              </a:ext>
+            </a:extLst>
+          </p:cNvPr>
+          <p:cNvSpPr txBox="1"/>
+          <p:nvPr/>
+        </p:nvSpPr>
+        <p:spPr>
+          <a:xfrm>
+            <a:off x="2112381" y="2834055"/>
+            <a:ext cx="850738" cy="369332"/>
+          </a:xfrm>
+          <a:prstGeom prst="rect">
+            <a:avLst/>
+          </a:prstGeom>
+          <a:noFill/>
+        </p:spPr>
+        <p:txBody>
+          <a:bodyPr wrap="square" rtlCol="0">
+            <a:spAutoFit/>
+          </a:bodyPr>
+          <a:lstStyle/>
+          <a:p>
+            <a:r>
+              <a:rPr lang="en-US" dirty="0"/>
+              <a:t>West</a:t>
+            </a:r>
+          </a:p>
+        </p:txBody>
+      </p:sp>
+      <p:sp>
+        <p:nvSpPr>
+          <p:cNvPr id="25" name="TextBox 24">
+            <a:extLst>
+              <a:ext uri="{FF2B5EF4-FFF2-40B4-BE49-F238E27FC236}">
+                <a16:creationId xmlns:a16="http://schemas.microsoft.com/office/drawing/2014/main" id="{6C053093-9F20-7854-530A-9062F4CFDA7F}"/>
+              </a:ext>
+            </a:extLst>
+          </p:cNvPr>
+          <p:cNvSpPr txBox="1"/>
+          <p:nvPr/>
+        </p:nvSpPr>
+        <p:spPr>
+          <a:xfrm>
+            <a:off x="6867646" y="788136"/>
+            <a:ext cx="1414039" cy="369332"/>
+          </a:xfrm>
+          <a:prstGeom prst="rect">
+            <a:avLst/>
+          </a:prstGeom>
+          <a:noFill/>
+        </p:spPr>
+        <p:txBody>
+          <a:bodyPr wrap="square" rtlCol="0">
+            <a:spAutoFit/>
+          </a:bodyPr>
+          <a:lstStyle/>
+          <a:p>
+            <a:r>
+              <a:rPr lang="en-US" dirty="0"/>
+              <a:t>North-east</a:t>
+            </a:r>
+          </a:p>
+        </p:txBody>
+      </p:sp>
+      <p:sp>
+        <p:nvSpPr>
+          <p:cNvPr id="26" name="TextBox 25">
+            <a:extLst>
+              <a:ext uri="{FF2B5EF4-FFF2-40B4-BE49-F238E27FC236}">
+                <a16:creationId xmlns:a16="http://schemas.microsoft.com/office/drawing/2014/main" id="{45F24D8E-ABA2-51B1-19D7-D8B53F0F47B3}"/>
+              </a:ext>
+            </a:extLst>
+          </p:cNvPr>
+          <p:cNvSpPr txBox="1"/>
+          <p:nvPr/>
+        </p:nvSpPr>
+        <p:spPr>
+          <a:xfrm>
+            <a:off x="2112381" y="788136"/>
+            <a:ext cx="1325300" cy="369332"/>
+          </a:xfrm>
+          <a:prstGeom prst="rect">
+            <a:avLst/>
+          </a:prstGeom>
+          <a:noFill/>
+        </p:spPr>
+        <p:txBody>
+          <a:bodyPr wrap="square" rtlCol="0">
+            <a:spAutoFit/>
+          </a:bodyPr>
+          <a:lstStyle/>
+          <a:p>
+            <a:r>
+              <a:rPr lang="en-US" dirty="0"/>
+              <a:t>North-west</a:t>
+            </a:r>
+          </a:p>
+        </p:txBody>
+      </p:sp>
+      <p:sp>
+        <p:nvSpPr>
+          <p:cNvPr id="33" name="TextBox 32">
+            <a:extLst>
+              <a:ext uri="{FF2B5EF4-FFF2-40B4-BE49-F238E27FC236}">
+                <a16:creationId xmlns:a16="http://schemas.microsoft.com/office/drawing/2014/main" id="{F55F5C18-E09A-9409-E8C3-0DBE7DC2FDB2}"/>
+              </a:ext>
+            </a:extLst>
+          </p:cNvPr>
+          <p:cNvSpPr txBox="1"/>
+          <p:nvPr/>
+        </p:nvSpPr>
+        <p:spPr>
+          <a:xfrm>
+            <a:off x="4517986" y="5120210"/>
+            <a:ext cx="850738" cy="369332"/>
+          </a:xfrm>
+          <a:prstGeom prst="rect">
+            <a:avLst/>
+          </a:prstGeom>
+          <a:noFill/>
+        </p:spPr>
+        <p:txBody>
+          <a:bodyPr wrap="square" rtlCol="0">
+            <a:spAutoFit/>
+          </a:bodyPr>
+          <a:lstStyle/>
+          <a:p>
+            <a:r>
+              <a:rPr lang="en-US" dirty="0"/>
+              <a:t>South</a:t>
+            </a:r>
+          </a:p>
+        </p:txBody>
+      </p:sp>
+      <p:sp>
+        <p:nvSpPr>
+          <p:cNvPr id="34" name="TextBox 33">
+            <a:extLst>
+              <a:ext uri="{FF2B5EF4-FFF2-40B4-BE49-F238E27FC236}">
+                <a16:creationId xmlns:a16="http://schemas.microsoft.com/office/drawing/2014/main" id="{2C74B657-DF57-F552-0A2A-1C1132E1708E}"/>
+              </a:ext>
+            </a:extLst>
+          </p:cNvPr>
+          <p:cNvSpPr txBox="1"/>
+          <p:nvPr/>
+        </p:nvSpPr>
+        <p:spPr>
+          <a:xfrm>
+            <a:off x="6867646" y="5120210"/>
+            <a:ext cx="1414039" cy="369332"/>
+          </a:xfrm>
+          <a:prstGeom prst="rect">
+            <a:avLst/>
+          </a:prstGeom>
+          <a:noFill/>
+        </p:spPr>
+        <p:txBody>
+          <a:bodyPr wrap="square" rtlCol="0">
+            <a:spAutoFit/>
+          </a:bodyPr>
+          <a:lstStyle/>
+          <a:p>
+            <a:r>
+              <a:rPr lang="en-US" dirty="0"/>
+              <a:t>South-east</a:t>
+            </a:r>
+          </a:p>
+        </p:txBody>
+      </p:sp>
+      <p:sp>
+        <p:nvSpPr>
+          <p:cNvPr id="35" name="TextBox 34">
+            <a:extLst>
+              <a:ext uri="{FF2B5EF4-FFF2-40B4-BE49-F238E27FC236}">
+                <a16:creationId xmlns:a16="http://schemas.microsoft.com/office/drawing/2014/main" id="{5FCE8D7B-CAF9-06B3-1303-465E44F2A35B}"/>
+              </a:ext>
+            </a:extLst>
+          </p:cNvPr>
+          <p:cNvSpPr txBox="1"/>
+          <p:nvPr/>
+        </p:nvSpPr>
+        <p:spPr>
+          <a:xfrm>
+            <a:off x="2112381" y="5120210"/>
+            <a:ext cx="1325300" cy="369332"/>
+          </a:xfrm>
+          <a:prstGeom prst="rect">
+            <a:avLst/>
+          </a:prstGeom>
+          <a:noFill/>
+        </p:spPr>
+        <p:txBody>
+          <a:bodyPr wrap="square" rtlCol="0">
+            <a:spAutoFit/>
+          </a:bodyPr>
+          <a:lstStyle/>
+          <a:p>
+            <a:r>
+              <a:rPr lang="en-US" dirty="0"/>
+              <a:t>South-west</a:t>
+            </a:r>
+          </a:p>
+        </p:txBody>
+      </p:sp>
+    </p:spTree>
+    <p:extLst>
+      <p:ext uri="{BB962C8B-B14F-4D97-AF65-F5344CB8AC3E}">
+        <p14:creationId xmlns:p14="http://schemas.microsoft.com/office/powerpoint/2010/main" val="2130251938"/>
       </p:ext>
     </p:extLst>
   </p:cSld>

</xml_diff>